<commit_message>
Modif Partie Back & front end
</commit_message>
<xml_diff>
--- a/presentation.pptx
+++ b/presentation.pptx
@@ -118,7 +118,7 @@
   </p:defaultTextStyle>
   <p:extLst>
     <p:ext uri="{EFAFB233-063F-42B5-8137-9DF3F51BA10A}">
-      <p15:sldGuideLst xmlns="" xmlns:p15="http://schemas.microsoft.com/office/powerpoint/2012/main">
+      <p15:sldGuideLst xmlns:p15="http://schemas.microsoft.com/office/powerpoint/2012/main">
         <p15:guide id="1" orient="horz" pos="2160">
           <p15:clr>
             <a:srgbClr val="A4A3A4"/>
@@ -221,7 +221,7 @@
           <a:p>
             <a:fld id="{1BC3700B-4EEC-445A-BA32-5FE574FD12A9}" type="datetimeFigureOut">
               <a:rPr lang="fr-FR" smtClean="0"/>
-              <a:t>24/02/2018</a:t>
+              <a:t>10/03/2018</a:t>
             </a:fld>
             <a:endParaRPr lang="fr-FR"/>
           </a:p>
@@ -489,6 +489,630 @@
 </p:notesMaster>
 </file>
 
+<file path=ppt/notesSlides/notesSlide1.xml><?xml version="1.0" encoding="utf-8"?>
+<p:notes xmlns:a="http://schemas.openxmlformats.org/drawingml/2006/main" xmlns:r="http://schemas.openxmlformats.org/officeDocument/2006/relationships" xmlns:p="http://schemas.openxmlformats.org/presentationml/2006/main">
+  <p:cSld>
+    <p:spTree>
+      <p:nvGrpSpPr>
+        <p:cNvPr id="1" name=""/>
+        <p:cNvGrpSpPr/>
+        <p:nvPr/>
+      </p:nvGrpSpPr>
+      <p:grpSpPr>
+        <a:xfrm>
+          <a:off x="0" y="0"/>
+          <a:ext cx="0" cy="0"/>
+          <a:chOff x="0" y="0"/>
+          <a:chExt cx="0" cy="0"/>
+        </a:xfrm>
+      </p:grpSpPr>
+      <p:sp>
+        <p:nvSpPr>
+          <p:cNvPr id="2" name="Espace réservé de l'image des diapositives 1"/>
+          <p:cNvSpPr>
+            <a:spLocks noGrp="1" noRot="1" noChangeAspect="1"/>
+          </p:cNvSpPr>
+          <p:nvPr>
+            <p:ph type="sldImg"/>
+          </p:nvPr>
+        </p:nvSpPr>
+        <p:spPr/>
+      </p:sp>
+      <p:sp>
+        <p:nvSpPr>
+          <p:cNvPr id="3" name="Espace réservé des notes 2"/>
+          <p:cNvSpPr>
+            <a:spLocks noGrp="1"/>
+          </p:cNvSpPr>
+          <p:nvPr>
+            <p:ph type="body" idx="1"/>
+          </p:nvPr>
+        </p:nvSpPr>
+        <p:spPr/>
+        <p:txBody>
+          <a:bodyPr/>
+          <a:lstStyle/>
+          <a:p>
+            <a:r>
+              <a:rPr lang="fr-FR" sz="1200" b="0" i="0" kern="1200" smtClean="0">
+                <a:solidFill>
+                  <a:schemeClr val="tx1"/>
+                </a:solidFill>
+                <a:effectLst/>
+                <a:latin typeface="+mn-lt"/>
+                <a:ea typeface="+mn-ea"/>
+                <a:cs typeface="+mn-cs"/>
+              </a:rPr>
+              <a:t>basé </a:t>
+            </a:r>
+            <a:r>
+              <a:rPr lang="fr-FR" sz="1200" b="0" i="0" kern="1200" dirty="0" smtClean="0">
+                <a:solidFill>
+                  <a:schemeClr val="tx1"/>
+                </a:solidFill>
+                <a:effectLst/>
+                <a:latin typeface="+mn-lt"/>
+                <a:ea typeface="+mn-ea"/>
+                <a:cs typeface="+mn-cs"/>
+              </a:rPr>
+              <a:t>initialement sur </a:t>
+            </a:r>
+            <a:r>
+              <a:rPr lang="fr-FR" sz="1200" b="0" i="0" u="none" strike="noStrike" kern="1200" dirty="0" err="1" smtClean="0">
+                <a:solidFill>
+                  <a:schemeClr val="tx1"/>
+                </a:solidFill>
+                <a:effectLst/>
+                <a:latin typeface="+mn-lt"/>
+                <a:ea typeface="+mn-ea"/>
+                <a:cs typeface="+mn-cs"/>
+                <a:hlinkClick r:id="rId3" tooltip="AngularJS"/>
+              </a:rPr>
+              <a:t>AngularJS</a:t>
+            </a:r>
+            <a:r>
+              <a:rPr lang="fr-FR" sz="1200" b="0" i="0" kern="1200" dirty="0" smtClean="0">
+                <a:solidFill>
+                  <a:schemeClr val="tx1"/>
+                </a:solidFill>
+                <a:effectLst/>
+                <a:latin typeface="+mn-lt"/>
+                <a:ea typeface="+mn-ea"/>
+                <a:cs typeface="+mn-cs"/>
+              </a:rPr>
+              <a:t> et </a:t>
+            </a:r>
+            <a:r>
+              <a:rPr lang="fr-FR" sz="1200" b="0" i="0" u="none" strike="noStrike" kern="1200" dirty="0" smtClean="0">
+                <a:solidFill>
+                  <a:schemeClr val="tx1"/>
+                </a:solidFill>
+                <a:effectLst/>
+                <a:latin typeface="+mn-lt"/>
+                <a:ea typeface="+mn-ea"/>
+                <a:cs typeface="+mn-cs"/>
+                <a:hlinkClick r:id="rId4" tooltip="Apache Cordova"/>
+              </a:rPr>
+              <a:t>Apache Cordova</a:t>
+            </a:r>
+            <a:r>
+              <a:rPr lang="fr-FR" sz="1200" b="0" i="0" u="none" strike="noStrike" kern="1200" baseline="30000" dirty="0" smtClean="0">
+                <a:solidFill>
+                  <a:schemeClr val="tx1"/>
+                </a:solidFill>
+                <a:effectLst/>
+                <a:latin typeface="+mn-lt"/>
+                <a:ea typeface="+mn-ea"/>
+                <a:cs typeface="+mn-cs"/>
+                <a:hlinkClick r:id="rId5"/>
+              </a:rPr>
+              <a:t>2</a:t>
+            </a:r>
+            <a:r>
+              <a:rPr lang="fr-FR" sz="1200" b="0" i="0" kern="1200" dirty="0" smtClean="0">
+                <a:solidFill>
+                  <a:schemeClr val="tx1"/>
+                </a:solidFill>
+                <a:effectLst/>
+                <a:latin typeface="+mn-lt"/>
+                <a:ea typeface="+mn-ea"/>
+                <a:cs typeface="+mn-cs"/>
+              </a:rPr>
+              <a:t>, </a:t>
+            </a:r>
+            <a:r>
+              <a:rPr lang="fr-FR" sz="1200" b="0" i="0" kern="1200" dirty="0" err="1" smtClean="0">
+                <a:solidFill>
+                  <a:schemeClr val="tx1"/>
+                </a:solidFill>
+                <a:effectLst/>
+                <a:latin typeface="+mn-lt"/>
+                <a:ea typeface="+mn-ea"/>
+                <a:cs typeface="+mn-cs"/>
+              </a:rPr>
+              <a:t>Ionic</a:t>
+            </a:r>
+            <a:r>
+              <a:rPr lang="fr-FR" sz="1200" b="0" i="0" kern="1200" dirty="0" smtClean="0">
+                <a:solidFill>
+                  <a:schemeClr val="tx1"/>
+                </a:solidFill>
+                <a:effectLst/>
+                <a:latin typeface="+mn-lt"/>
+                <a:ea typeface="+mn-ea"/>
+                <a:cs typeface="+mn-cs"/>
+              </a:rPr>
+              <a:t> permet de créer un code </a:t>
+            </a:r>
+            <a:r>
+              <a:rPr lang="fr-FR" sz="1200" b="0" i="0" kern="1200" dirty="0" err="1" smtClean="0">
+                <a:solidFill>
+                  <a:schemeClr val="tx1"/>
+                </a:solidFill>
+                <a:effectLst/>
+                <a:latin typeface="+mn-lt"/>
+                <a:ea typeface="+mn-ea"/>
+                <a:cs typeface="+mn-cs"/>
+              </a:rPr>
+              <a:t>multisupport</a:t>
+            </a:r>
+            <a:r>
+              <a:rPr lang="fr-FR" sz="1200" b="0" i="0" kern="1200" dirty="0" smtClean="0">
+                <a:solidFill>
+                  <a:schemeClr val="tx1"/>
+                </a:solidFill>
+                <a:effectLst/>
+                <a:latin typeface="+mn-lt"/>
+                <a:ea typeface="+mn-ea"/>
+                <a:cs typeface="+mn-cs"/>
+              </a:rPr>
+              <a:t> en utilisant des outils </a:t>
+            </a:r>
+            <a:r>
+              <a:rPr lang="fr-FR" sz="1200" b="0" i="0" u="none" strike="noStrike" kern="1200" dirty="0" smtClean="0">
+                <a:solidFill>
+                  <a:schemeClr val="tx1"/>
+                </a:solidFill>
+                <a:effectLst/>
+                <a:latin typeface="+mn-lt"/>
+                <a:ea typeface="+mn-ea"/>
+                <a:cs typeface="+mn-cs"/>
+                <a:hlinkClick r:id="rId6" tooltip="Web"/>
+              </a:rPr>
+              <a:t>Web</a:t>
+            </a:r>
+            <a:r>
+              <a:rPr lang="fr-FR" sz="1200" b="0" i="0" kern="1200" dirty="0" smtClean="0">
+                <a:solidFill>
+                  <a:schemeClr val="tx1"/>
+                </a:solidFill>
+                <a:effectLst/>
+                <a:latin typeface="+mn-lt"/>
+                <a:ea typeface="+mn-ea"/>
+                <a:cs typeface="+mn-cs"/>
+              </a:rPr>
+              <a:t> comme </a:t>
+            </a:r>
+            <a:r>
+              <a:rPr lang="fr-FR" sz="1200" b="0" i="0" u="none" strike="noStrike" kern="1200" dirty="0" smtClean="0">
+                <a:solidFill>
+                  <a:schemeClr val="tx1"/>
+                </a:solidFill>
+                <a:effectLst/>
+                <a:latin typeface="+mn-lt"/>
+                <a:ea typeface="+mn-ea"/>
+                <a:cs typeface="+mn-cs"/>
+                <a:hlinkClick r:id="rId7" tooltip="HTML"/>
+              </a:rPr>
+              <a:t>HTML</a:t>
+            </a:r>
+            <a:r>
+              <a:rPr lang="fr-FR" sz="1200" b="0" i="0" kern="1200" dirty="0" smtClean="0">
+                <a:solidFill>
+                  <a:schemeClr val="tx1"/>
+                </a:solidFill>
+                <a:effectLst/>
+                <a:latin typeface="+mn-lt"/>
+                <a:ea typeface="+mn-ea"/>
+                <a:cs typeface="+mn-cs"/>
+              </a:rPr>
+              <a:t>, </a:t>
+            </a:r>
+            <a:r>
+              <a:rPr lang="fr-FR" sz="1200" b="0" i="0" u="none" strike="noStrike" kern="1200" dirty="0" smtClean="0">
+                <a:solidFill>
+                  <a:schemeClr val="tx1"/>
+                </a:solidFill>
+                <a:effectLst/>
+                <a:latin typeface="+mn-lt"/>
+                <a:ea typeface="+mn-ea"/>
+                <a:cs typeface="+mn-cs"/>
+                <a:hlinkClick r:id="rId8" tooltip="Feuilles de style en cascade"/>
+              </a:rPr>
+              <a:t>CSS</a:t>
+            </a:r>
+            <a:r>
+              <a:rPr lang="fr-FR" sz="1200" b="0" i="0" kern="1200" dirty="0" smtClean="0">
+                <a:solidFill>
+                  <a:schemeClr val="tx1"/>
+                </a:solidFill>
+                <a:effectLst/>
+                <a:latin typeface="+mn-lt"/>
+                <a:ea typeface="+mn-ea"/>
+                <a:cs typeface="+mn-cs"/>
+              </a:rPr>
+              <a:t>, </a:t>
+            </a:r>
+            <a:r>
+              <a:rPr lang="fr-FR" sz="1200" b="0" i="0" u="none" strike="noStrike" kern="1200" dirty="0" smtClean="0">
+                <a:solidFill>
+                  <a:schemeClr val="tx1"/>
+                </a:solidFill>
+                <a:effectLst/>
+                <a:latin typeface="+mn-lt"/>
+                <a:ea typeface="+mn-ea"/>
+                <a:cs typeface="+mn-cs"/>
+                <a:hlinkClick r:id="rId9" tooltip="JavaScript"/>
+              </a:rPr>
+              <a:t>JavaScript</a:t>
+            </a:r>
+            <a:r>
+              <a:rPr lang="fr-FR" sz="1200" b="0" i="0" kern="1200" dirty="0" smtClean="0">
+                <a:solidFill>
+                  <a:schemeClr val="tx1"/>
+                </a:solidFill>
+                <a:effectLst/>
+                <a:latin typeface="+mn-lt"/>
+                <a:ea typeface="+mn-ea"/>
+                <a:cs typeface="+mn-cs"/>
+              </a:rPr>
+              <a:t>, afin de générer des applications </a:t>
+            </a:r>
+            <a:r>
+              <a:rPr lang="fr-FR" sz="1200" b="0" i="0" u="none" strike="noStrike" kern="1200" dirty="0" smtClean="0">
+                <a:solidFill>
+                  <a:schemeClr val="tx1"/>
+                </a:solidFill>
+                <a:effectLst/>
+                <a:latin typeface="+mn-lt"/>
+                <a:ea typeface="+mn-ea"/>
+                <a:cs typeface="+mn-cs"/>
+                <a:hlinkClick r:id="rId10" tooltip="Apple iOS"/>
+              </a:rPr>
+              <a:t>iOS</a:t>
+            </a:r>
+            <a:r>
+              <a:rPr lang="fr-FR" sz="1200" b="0" i="0" kern="1200" dirty="0" smtClean="0">
+                <a:solidFill>
+                  <a:schemeClr val="tx1"/>
+                </a:solidFill>
+                <a:effectLst/>
+                <a:latin typeface="+mn-lt"/>
+                <a:ea typeface="+mn-ea"/>
+                <a:cs typeface="+mn-cs"/>
+              </a:rPr>
+              <a:t>, </a:t>
+            </a:r>
+            <a:r>
+              <a:rPr lang="fr-FR" sz="1200" b="0" i="0" u="none" strike="noStrike" kern="1200" dirty="0" smtClean="0">
+                <a:solidFill>
+                  <a:schemeClr val="tx1"/>
+                </a:solidFill>
+                <a:effectLst/>
+                <a:latin typeface="+mn-lt"/>
+                <a:ea typeface="+mn-ea"/>
+                <a:cs typeface="+mn-cs"/>
+                <a:hlinkClick r:id="rId11" tooltip="Android"/>
+              </a:rPr>
+              <a:t>Android</a:t>
+            </a:r>
+            <a:r>
+              <a:rPr lang="fr-FR" sz="1200" b="0" i="0" kern="1200" dirty="0" smtClean="0">
+                <a:solidFill>
+                  <a:schemeClr val="tx1"/>
+                </a:solidFill>
+                <a:effectLst/>
+                <a:latin typeface="+mn-lt"/>
+                <a:ea typeface="+mn-ea"/>
+                <a:cs typeface="+mn-cs"/>
+              </a:rPr>
+              <a:t>, </a:t>
+            </a:r>
+            <a:r>
+              <a:rPr lang="fr-FR" sz="1200" b="0" i="0" u="none" strike="noStrike" kern="1200" dirty="0" smtClean="0">
+                <a:solidFill>
+                  <a:schemeClr val="tx1"/>
+                </a:solidFill>
+                <a:effectLst/>
+                <a:latin typeface="+mn-lt"/>
+                <a:ea typeface="+mn-ea"/>
+                <a:cs typeface="+mn-cs"/>
+                <a:hlinkClick r:id="rId12" tooltip="Chrome OS"/>
+              </a:rPr>
+              <a:t>Chrome</a:t>
+            </a:r>
+            <a:r>
+              <a:rPr lang="fr-FR" sz="1200" b="0" i="0" kern="1200" dirty="0" smtClean="0">
+                <a:solidFill>
+                  <a:schemeClr val="tx1"/>
+                </a:solidFill>
+                <a:effectLst/>
+                <a:latin typeface="+mn-lt"/>
+                <a:ea typeface="+mn-ea"/>
+                <a:cs typeface="+mn-cs"/>
+              </a:rPr>
+              <a:t>, </a:t>
+            </a:r>
+            <a:r>
+              <a:rPr lang="fr-FR" sz="1200" b="0" i="0" u="none" strike="noStrike" kern="1200" dirty="0" smtClean="0">
+                <a:solidFill>
+                  <a:schemeClr val="tx1"/>
+                </a:solidFill>
+                <a:effectLst/>
+                <a:latin typeface="+mn-lt"/>
+                <a:ea typeface="+mn-ea"/>
+                <a:cs typeface="+mn-cs"/>
+                <a:hlinkClick r:id="rId13" tooltip="Windows Phone"/>
+              </a:rPr>
+              <a:t>Windows Phone</a:t>
+            </a:r>
+            <a:r>
+              <a:rPr lang="fr-FR" sz="1200" b="0" i="0" kern="1200" dirty="0" smtClean="0">
+                <a:solidFill>
+                  <a:schemeClr val="tx1"/>
+                </a:solidFill>
+                <a:effectLst/>
+                <a:latin typeface="+mn-lt"/>
+                <a:ea typeface="+mn-ea"/>
+                <a:cs typeface="+mn-cs"/>
+              </a:rPr>
+              <a:t> et bien d'autres.</a:t>
+            </a:r>
+            <a:endParaRPr lang="fr-FR" dirty="0" smtClean="0"/>
+          </a:p>
+          <a:p>
+            <a:endParaRPr lang="fr-FR" dirty="0" smtClean="0"/>
+          </a:p>
+          <a:p>
+            <a:endParaRPr lang="fr-FR" dirty="0" smtClean="0"/>
+          </a:p>
+          <a:p>
+            <a:r>
+              <a:rPr lang="fr-FR" dirty="0" smtClean="0"/>
+              <a:t>Les applications ioniques sont constituées de blocs de construction de haut niveau appelés composants. Les composants vous permettent de créer rapidement une interface pour votre application. </a:t>
+            </a:r>
+            <a:r>
+              <a:rPr lang="fr-FR" dirty="0" err="1" smtClean="0"/>
+              <a:t>Ionic</a:t>
+            </a:r>
+            <a:r>
+              <a:rPr lang="fr-FR" dirty="0" smtClean="0"/>
+              <a:t> est livré avec un certain nombre de composants, y compris les modaux, les </a:t>
+            </a:r>
+            <a:r>
+              <a:rPr lang="fr-FR" dirty="0" err="1" smtClean="0"/>
+              <a:t>popups</a:t>
+            </a:r>
+            <a:r>
+              <a:rPr lang="fr-FR" dirty="0" smtClean="0"/>
+              <a:t> et les cartes.</a:t>
+            </a:r>
+            <a:endParaRPr lang="fr-FR" dirty="0"/>
+          </a:p>
+        </p:txBody>
+      </p:sp>
+      <p:sp>
+        <p:nvSpPr>
+          <p:cNvPr id="4" name="Espace réservé du numéro de diapositive 3"/>
+          <p:cNvSpPr>
+            <a:spLocks noGrp="1"/>
+          </p:cNvSpPr>
+          <p:nvPr>
+            <p:ph type="sldNum" sz="quarter" idx="10"/>
+          </p:nvPr>
+        </p:nvSpPr>
+        <p:spPr/>
+        <p:txBody>
+          <a:bodyPr/>
+          <a:lstStyle/>
+          <a:p>
+            <a:fld id="{33D0D4F3-7D52-472F-A6D8-300C270D9384}" type="slidenum">
+              <a:rPr lang="fr-FR" smtClean="0"/>
+              <a:t>5</a:t>
+            </a:fld>
+            <a:endParaRPr lang="fr-FR"/>
+          </a:p>
+        </p:txBody>
+      </p:sp>
+    </p:spTree>
+    <p:extLst>
+      <p:ext uri="{BB962C8B-B14F-4D97-AF65-F5344CB8AC3E}">
+        <p14:creationId xmlns:p14="http://schemas.microsoft.com/office/powerpoint/2010/main" val="2096099630"/>
+      </p:ext>
+    </p:extLst>
+  </p:cSld>
+  <p:clrMapOvr>
+    <a:masterClrMapping/>
+  </p:clrMapOvr>
+</p:notes>
+</file>
+
+<file path=ppt/notesSlides/notesSlide2.xml><?xml version="1.0" encoding="utf-8"?>
+<p:notes xmlns:a="http://schemas.openxmlformats.org/drawingml/2006/main" xmlns:r="http://schemas.openxmlformats.org/officeDocument/2006/relationships" xmlns:p="http://schemas.openxmlformats.org/presentationml/2006/main">
+  <p:cSld>
+    <p:spTree>
+      <p:nvGrpSpPr>
+        <p:cNvPr id="1" name=""/>
+        <p:cNvGrpSpPr/>
+        <p:nvPr/>
+      </p:nvGrpSpPr>
+      <p:grpSpPr>
+        <a:xfrm>
+          <a:off x="0" y="0"/>
+          <a:ext cx="0" cy="0"/>
+          <a:chOff x="0" y="0"/>
+          <a:chExt cx="0" cy="0"/>
+        </a:xfrm>
+      </p:grpSpPr>
+      <p:sp>
+        <p:nvSpPr>
+          <p:cNvPr id="2" name="Espace réservé de l'image des diapositives 1"/>
+          <p:cNvSpPr>
+            <a:spLocks noGrp="1" noRot="1" noChangeAspect="1"/>
+          </p:cNvSpPr>
+          <p:nvPr>
+            <p:ph type="sldImg"/>
+          </p:nvPr>
+        </p:nvSpPr>
+        <p:spPr/>
+      </p:sp>
+      <p:sp>
+        <p:nvSpPr>
+          <p:cNvPr id="3" name="Espace réservé des notes 2"/>
+          <p:cNvSpPr>
+            <a:spLocks noGrp="1"/>
+          </p:cNvSpPr>
+          <p:nvPr>
+            <p:ph type="body" idx="1"/>
+          </p:nvPr>
+        </p:nvSpPr>
+        <p:spPr/>
+        <p:txBody>
+          <a:bodyPr/>
+          <a:lstStyle/>
+          <a:p>
+            <a:pPr marL="0" marR="0" lvl="0" indent="0" algn="l" defTabSz="914400" rtl="0" eaLnBrk="1" fontAlgn="auto" latinLnBrk="0" hangingPunct="1">
+              <a:lnSpc>
+                <a:spcPct val="100000"/>
+              </a:lnSpc>
+              <a:spcBef>
+                <a:spcPts val="0"/>
+              </a:spcBef>
+              <a:spcAft>
+                <a:spcPts val="0"/>
+              </a:spcAft>
+              <a:buClrTx/>
+              <a:buSzTx/>
+              <a:buFontTx/>
+              <a:buNone/>
+              <a:tabLst/>
+              <a:defRPr/>
+            </a:pPr>
+            <a:r>
+              <a:rPr lang="fr-FR" b="1" dirty="0" err="1" smtClean="0">
+                <a:latin typeface="Calibri Light" panose="020F0302020204030204" pitchFamily="34" charset="0"/>
+                <a:cs typeface="Calibri Light" panose="020F0302020204030204" pitchFamily="34" charset="0"/>
+              </a:rPr>
+              <a:t>AngularJS</a:t>
+            </a:r>
+            <a:r>
+              <a:rPr lang="fr-FR" dirty="0" smtClean="0">
+                <a:latin typeface="Calibri Light" panose="020F0302020204030204" pitchFamily="34" charset="0"/>
+                <a:cs typeface="Calibri Light" panose="020F0302020204030204" pitchFamily="34" charset="0"/>
+              </a:rPr>
+              <a:t>  pour l’application web : Stabilité</a:t>
+            </a:r>
+          </a:p>
+          <a:p>
+            <a:pPr marL="0" marR="0" lvl="0" indent="0" algn="l" defTabSz="914400" rtl="0" eaLnBrk="1" fontAlgn="auto" latinLnBrk="0" hangingPunct="1">
+              <a:lnSpc>
+                <a:spcPct val="100000"/>
+              </a:lnSpc>
+              <a:spcBef>
+                <a:spcPts val="0"/>
+              </a:spcBef>
+              <a:spcAft>
+                <a:spcPts val="0"/>
+              </a:spcAft>
+              <a:buClrTx/>
+              <a:buSzTx/>
+              <a:buFontTx/>
+              <a:buNone/>
+              <a:tabLst/>
+              <a:defRPr/>
+            </a:pPr>
+            <a:r>
+              <a:rPr lang="fr-FR" b="1" dirty="0" err="1" smtClean="0">
+                <a:latin typeface="Calibri Light" panose="020F0302020204030204" pitchFamily="34" charset="0"/>
+                <a:cs typeface="Calibri Light" panose="020F0302020204030204" pitchFamily="34" charset="0"/>
+              </a:rPr>
+              <a:t>Cordova</a:t>
+            </a:r>
+            <a:r>
+              <a:rPr lang="fr-FR" dirty="0" smtClean="0">
+                <a:latin typeface="Calibri Light" panose="020F0302020204030204" pitchFamily="34" charset="0"/>
+                <a:cs typeface="Calibri Light" panose="020F0302020204030204" pitchFamily="34" charset="0"/>
+              </a:rPr>
+              <a:t> pour la construction de l’applicatif natif</a:t>
+            </a:r>
+          </a:p>
+          <a:p>
+            <a:pPr marL="0" marR="0" lvl="0" indent="0" algn="l" defTabSz="914400" rtl="0" eaLnBrk="1" fontAlgn="auto" latinLnBrk="0" hangingPunct="1">
+              <a:lnSpc>
+                <a:spcPct val="100000"/>
+              </a:lnSpc>
+              <a:spcBef>
+                <a:spcPts val="0"/>
+              </a:spcBef>
+              <a:spcAft>
+                <a:spcPts val="0"/>
+              </a:spcAft>
+              <a:buClrTx/>
+              <a:buSzTx/>
+              <a:buFontTx/>
+              <a:buNone/>
+              <a:tabLst/>
+              <a:defRPr/>
+            </a:pPr>
+            <a:r>
+              <a:rPr lang="fr-FR" dirty="0" smtClean="0">
+                <a:latin typeface="Calibri Light" panose="020F0302020204030204" pitchFamily="34" charset="0"/>
+                <a:cs typeface="Calibri Light" panose="020F0302020204030204" pitchFamily="34" charset="0"/>
+              </a:rPr>
+              <a:t>Fonctionnalités pour se rapprocher du natif (gestes, évènements, slide, etc.)</a:t>
+            </a:r>
+          </a:p>
+          <a:p>
+            <a:endParaRPr lang="fr-FR" dirty="0"/>
+          </a:p>
+        </p:txBody>
+      </p:sp>
+      <p:sp>
+        <p:nvSpPr>
+          <p:cNvPr id="4" name="Espace réservé du numéro de diapositive 3"/>
+          <p:cNvSpPr>
+            <a:spLocks noGrp="1"/>
+          </p:cNvSpPr>
+          <p:nvPr>
+            <p:ph type="sldNum" sz="quarter" idx="10"/>
+          </p:nvPr>
+        </p:nvSpPr>
+        <p:spPr/>
+        <p:txBody>
+          <a:bodyPr/>
+          <a:lstStyle/>
+          <a:p>
+            <a:fld id="{33D0D4F3-7D52-472F-A6D8-300C270D9384}" type="slidenum">
+              <a:rPr lang="fr-FR" smtClean="0"/>
+              <a:t>6</a:t>
+            </a:fld>
+            <a:endParaRPr lang="fr-FR"/>
+          </a:p>
+        </p:txBody>
+      </p:sp>
+    </p:spTree>
+    <p:extLst>
+      <p:ext uri="{BB962C8B-B14F-4D97-AF65-F5344CB8AC3E}">
+        <p14:creationId xmlns:p14="http://schemas.microsoft.com/office/powerpoint/2010/main" val="3370572821"/>
+      </p:ext>
+    </p:extLst>
+  </p:cSld>
+  <p:clrMapOvr>
+    <a:masterClrMapping/>
+  </p:clrMapOvr>
+</p:notes>
+</file>
+
 <file path=ppt/slideLayouts/slideLayout1.xml><?xml version="1.0" encoding="utf-8"?>
 <p:sldLayout xmlns:a="http://schemas.openxmlformats.org/drawingml/2006/main" xmlns:r="http://schemas.openxmlformats.org/officeDocument/2006/relationships" xmlns:p="http://schemas.openxmlformats.org/presentationml/2006/main" showMasterSp="0" type="title" preserve="1">
   <p:cSld name="Diapositive de titre">
@@ -614,7 +1238,7 @@
           <a:p>
             <a:fld id="{9E902D1D-38E6-40C1-884A-5B6A13BB66A5}" type="datetime1">
               <a:rPr lang="fr-FR" smtClean="0"/>
-              <a:t>24/02/2018</a:t>
+              <a:t>10/03/2018</a:t>
             </a:fld>
             <a:endParaRPr lang="fr-FR"/>
           </a:p>
@@ -1247,7 +1871,7 @@
           <a:p>
             <a:fld id="{E2F24817-7951-4030-A7FE-333D7C1D5674}" type="datetime1">
               <a:rPr lang="fr-FR" smtClean="0"/>
-              <a:t>24/02/2018</a:t>
+              <a:t>10/03/2018</a:t>
             </a:fld>
             <a:endParaRPr lang="fr-FR"/>
           </a:p>
@@ -1524,7 +2148,7 @@
           <a:p>
             <a:fld id="{CDD52DA3-7C8C-4416-8B26-10BEBF1FDEC4}" type="datetime1">
               <a:rPr lang="fr-FR" smtClean="0"/>
-              <a:t>24/02/2018</a:t>
+              <a:t>10/03/2018</a:t>
             </a:fld>
             <a:endParaRPr lang="fr-FR"/>
           </a:p>
@@ -1689,7 +2313,7 @@
           <a:p>
             <a:fld id="{708E9D96-6BD6-4F7F-840C-0D4A52DD244B}" type="datetime1">
               <a:rPr lang="fr-FR" smtClean="0"/>
-              <a:t>24/02/2018</a:t>
+              <a:t>10/03/2018</a:t>
             </a:fld>
             <a:endParaRPr lang="fr-FR"/>
           </a:p>
@@ -1870,7 +2494,7 @@
           <a:p>
             <a:fld id="{E48F0521-5272-4A72-B201-CF649D153963}" type="datetime1">
               <a:rPr lang="fr-FR" smtClean="0"/>
-              <a:t>24/02/2018</a:t>
+              <a:t>10/03/2018</a:t>
             </a:fld>
             <a:endParaRPr lang="fr-FR"/>
           </a:p>
@@ -2515,7 +3139,7 @@
           <a:p>
             <a:fld id="{0E2672DA-25FF-4A4D-90F3-EBA1D2F0976F}" type="datetime1">
               <a:rPr lang="fr-FR" smtClean="0"/>
-              <a:t>24/02/2018</a:t>
+              <a:t>10/03/2018</a:t>
             </a:fld>
             <a:endParaRPr lang="fr-FR"/>
           </a:p>
@@ -2941,7 +3565,7 @@
           <a:p>
             <a:fld id="{D1831EB3-608E-4485-8302-DC3899566597}" type="datetime1">
               <a:rPr lang="fr-FR" smtClean="0"/>
-              <a:t>24/02/2018</a:t>
+              <a:t>10/03/2018</a:t>
             </a:fld>
             <a:endParaRPr lang="fr-FR"/>
           </a:p>
@@ -3054,7 +3678,7 @@
           <a:p>
             <a:fld id="{4D387871-560B-46D7-AFA4-87ECD55AA231}" type="datetime1">
               <a:rPr lang="fr-FR" smtClean="0"/>
-              <a:t>24/02/2018</a:t>
+              <a:t>10/03/2018</a:t>
             </a:fld>
             <a:endParaRPr lang="fr-FR"/>
           </a:p>
@@ -3235,7 +3859,7 @@
           <a:p>
             <a:fld id="{FCAE9258-9C7A-4C47-A926-DC8FDA2ED2A6}" type="datetime1">
               <a:rPr lang="fr-FR" smtClean="0"/>
-              <a:t>24/02/2018</a:t>
+              <a:t>10/03/2018</a:t>
             </a:fld>
             <a:endParaRPr lang="fr-FR"/>
           </a:p>
@@ -3501,7 +4125,7 @@
           <a:p>
             <a:fld id="{9D99298A-6091-45EC-AED6-0F728791400B}" type="datetime1">
               <a:rPr lang="fr-FR" smtClean="0"/>
-              <a:t>24/02/2018</a:t>
+              <a:t>10/03/2018</a:t>
             </a:fld>
             <a:endParaRPr lang="fr-FR"/>
           </a:p>
@@ -3971,7 +4595,7 @@
           <a:p>
             <a:fld id="{387FA8AA-8779-49A2-B871-604041CDEF53}" type="datetime1">
               <a:rPr lang="fr-FR" smtClean="0"/>
-              <a:t>24/02/2018</a:t>
+              <a:t>10/03/2018</a:t>
             </a:fld>
             <a:endParaRPr lang="fr-FR"/>
           </a:p>
@@ -4531,7 +5155,7 @@
           <a:p>
             <a:fld id="{EFA917F1-34E7-4474-93DD-056B6C68B51D}" type="datetime1">
               <a:rPr lang="fr-FR" smtClean="0"/>
-              <a:t>24/02/2018</a:t>
+              <a:t>10/03/2018</a:t>
             </a:fld>
             <a:endParaRPr lang="fr-FR"/>
           </a:p>
@@ -5527,14 +6151,7 @@
                 <a:latin typeface="Calibri Light" panose="020F0302020204030204" pitchFamily="34" charset="0"/>
                 <a:cs typeface="Calibri Light" panose="020F0302020204030204" pitchFamily="34" charset="0"/>
               </a:rPr>
-              <a:t>Applications mobiles hybrides | Technologies </a:t>
-            </a:r>
-            <a:r>
-              <a:rPr lang="fr-FR" dirty="0" smtClean="0">
-                <a:latin typeface="Calibri Light" panose="020F0302020204030204" pitchFamily="34" charset="0"/>
-                <a:cs typeface="Calibri Light" panose="020F0302020204030204" pitchFamily="34" charset="0"/>
-              </a:rPr>
-              <a:t>Web</a:t>
+              <a:t>Applications mobiles hybrides | Technologies Web</a:t>
             </a:r>
           </a:p>
           <a:p>
@@ -6052,7 +6669,7 @@
                 <a:latin typeface="Calibri Light" panose="020F0302020204030204" pitchFamily="34" charset="0"/>
                 <a:cs typeface="Calibri Light" panose="020F0302020204030204" pitchFamily="34" charset="0"/>
               </a:rPr>
-              <a:t>Côté interface graphique</a:t>
+              <a:t>FRONT-END</a:t>
             </a:r>
             <a:endParaRPr lang="fr-FR" dirty="0">
               <a:solidFill>
@@ -6085,19 +6702,8 @@
                 <a:latin typeface="Calibri Light" panose="020F0302020204030204" pitchFamily="34" charset="0"/>
                 <a:cs typeface="Calibri Light" panose="020F0302020204030204" pitchFamily="34" charset="0"/>
               </a:rPr>
-              <a:t>Propre thème HTML/CSS  |  Combiné à </a:t>
-            </a:r>
-            <a:r>
-              <a:rPr lang="fr-FR" dirty="0" err="1" smtClean="0">
-                <a:latin typeface="Calibri Light" panose="020F0302020204030204" pitchFamily="34" charset="0"/>
-                <a:cs typeface="Calibri Light" panose="020F0302020204030204" pitchFamily="34" charset="0"/>
-              </a:rPr>
-              <a:t>Sass</a:t>
-            </a:r>
-            <a:endParaRPr lang="fr-FR" dirty="0" smtClean="0">
-              <a:latin typeface="Calibri Light" panose="020F0302020204030204" pitchFamily="34" charset="0"/>
-              <a:cs typeface="Calibri Light" panose="020F0302020204030204" pitchFamily="34" charset="0"/>
-            </a:endParaRPr>
+              <a:t>Propre thème HTML/CSS  </a:t>
+            </a:r>
           </a:p>
           <a:p>
             <a:pPr algn="just"/>
@@ -6106,7 +6712,7 @@
                 <a:latin typeface="Calibri Light" panose="020F0302020204030204" pitchFamily="34" charset="0"/>
                 <a:cs typeface="Calibri Light" panose="020F0302020204030204" pitchFamily="34" charset="0"/>
               </a:rPr>
-              <a:t>Eléments habituels d’interface graphique mobile</a:t>
+              <a:t>Création ultra rapide des interfaces (Composants)</a:t>
             </a:r>
             <a:endParaRPr lang="fr-FR" dirty="0">
               <a:latin typeface="Calibri Light" panose="020F0302020204030204" pitchFamily="34" charset="0"/>
@@ -6124,7 +6730,7 @@
           <p:nvPr/>
         </p:nvPicPr>
         <p:blipFill>
-          <a:blip r:embed="rId2">
+          <a:blip r:embed="rId3">
             <a:extLst>
               <a:ext uri="{28A0092B-C50C-407E-A947-70E740481C1C}">
                 <a14:useLocalDpi xmlns:a14="http://schemas.microsoft.com/office/drawing/2010/main" val="0"/>
@@ -6178,7 +6784,7 @@
           <p:nvPr/>
         </p:nvPicPr>
         <p:blipFill>
-          <a:blip r:embed="rId3">
+          <a:blip r:embed="rId4">
             <a:extLst>
               <a:ext uri="{28A0092B-C50C-407E-A947-70E740481C1C}">
                 <a14:useLocalDpi xmlns:a14="http://schemas.microsoft.com/office/drawing/2010/main" val="0"/>
@@ -6306,7 +6912,7 @@
                 <a:latin typeface="Calibri Light" panose="020F0302020204030204" pitchFamily="34" charset="0"/>
                 <a:cs typeface="Calibri Light" panose="020F0302020204030204" pitchFamily="34" charset="0"/>
               </a:rPr>
-              <a:t>Côté Back-End</a:t>
+              <a:t>Back-End</a:t>
             </a:r>
             <a:endParaRPr lang="fr-FR" dirty="0">
               <a:solidFill>
@@ -6320,80 +6926,6 @@
       </p:sp>
       <p:sp>
         <p:nvSpPr>
-          <p:cNvPr id="3" name="Espace réservé du contenu 2"/>
-          <p:cNvSpPr>
-            <a:spLocks noGrp="1"/>
-          </p:cNvSpPr>
-          <p:nvPr>
-            <p:ph idx="1"/>
-          </p:nvPr>
-        </p:nvSpPr>
-        <p:spPr/>
-        <p:txBody>
-          <a:bodyPr/>
-          <a:lstStyle/>
-          <a:p>
-            <a:pPr algn="just"/>
-            <a:r>
-              <a:rPr lang="fr-FR" b="1" dirty="0" err="1" smtClean="0">
-                <a:latin typeface="Calibri Light" panose="020F0302020204030204" pitchFamily="34" charset="0"/>
-                <a:cs typeface="Calibri Light" panose="020F0302020204030204" pitchFamily="34" charset="0"/>
-              </a:rPr>
-              <a:t>AngularJS</a:t>
-            </a:r>
-            <a:r>
-              <a:rPr lang="fr-FR" dirty="0" smtClean="0">
-                <a:latin typeface="Calibri Light" panose="020F0302020204030204" pitchFamily="34" charset="0"/>
-                <a:cs typeface="Calibri Light" panose="020F0302020204030204" pitchFamily="34" charset="0"/>
-              </a:rPr>
-              <a:t>  pour l’application web : Stabilité</a:t>
-            </a:r>
-          </a:p>
-          <a:p>
-            <a:pPr algn="just"/>
-            <a:r>
-              <a:rPr lang="fr-FR" b="1" dirty="0" err="1" smtClean="0">
-                <a:latin typeface="Calibri Light" panose="020F0302020204030204" pitchFamily="34" charset="0"/>
-                <a:cs typeface="Calibri Light" panose="020F0302020204030204" pitchFamily="34" charset="0"/>
-              </a:rPr>
-              <a:t>Cordova</a:t>
-            </a:r>
-            <a:r>
-              <a:rPr lang="fr-FR" dirty="0" smtClean="0">
-                <a:latin typeface="Calibri Light" panose="020F0302020204030204" pitchFamily="34" charset="0"/>
-                <a:cs typeface="Calibri Light" panose="020F0302020204030204" pitchFamily="34" charset="0"/>
-              </a:rPr>
-              <a:t> pour la construction de l’applicatif natif</a:t>
-            </a:r>
-          </a:p>
-          <a:p>
-            <a:pPr algn="just"/>
-            <a:r>
-              <a:rPr lang="fr-FR" dirty="0" smtClean="0">
-                <a:latin typeface="Calibri Light" panose="020F0302020204030204" pitchFamily="34" charset="0"/>
-                <a:cs typeface="Calibri Light" panose="020F0302020204030204" pitchFamily="34" charset="0"/>
-              </a:rPr>
-              <a:t>Fonctionnalités pour se rapprocher du natif (gestes, évènements, slide, etc.)</a:t>
-            </a:r>
-          </a:p>
-          <a:p>
-            <a:pPr algn="just"/>
-            <a:endParaRPr lang="fr-FR" dirty="0" smtClean="0">
-              <a:latin typeface="Calibri Light" panose="020F0302020204030204" pitchFamily="34" charset="0"/>
-              <a:cs typeface="Calibri Light" panose="020F0302020204030204" pitchFamily="34" charset="0"/>
-            </a:endParaRPr>
-          </a:p>
-          <a:p>
-            <a:pPr algn="just"/>
-            <a:endParaRPr lang="fr-FR" dirty="0">
-              <a:latin typeface="Calibri Light" panose="020F0302020204030204" pitchFamily="34" charset="0"/>
-              <a:cs typeface="Calibri Light" panose="020F0302020204030204" pitchFamily="34" charset="0"/>
-            </a:endParaRPr>
-          </a:p>
-        </p:txBody>
-      </p:sp>
-      <p:sp>
-        <p:nvSpPr>
           <p:cNvPr id="4" name="Espace réservé du numéro de diapositive 3"/>
           <p:cNvSpPr>
             <a:spLocks noGrp="1"/>
@@ -6415,6 +6947,107 @@
           </a:p>
         </p:txBody>
       </p:sp>
+      <p:pic>
+        <p:nvPicPr>
+          <p:cNvPr id="1026" name="Picture 2" descr="Résultat de recherche d'images pour &quot;angular js png&quot;"/>
+          <p:cNvPicPr>
+            <a:picLocks noChangeAspect="1" noChangeArrowheads="1"/>
+          </p:cNvPicPr>
+          <p:nvPr/>
+        </p:nvPicPr>
+        <p:blipFill>
+          <a:blip r:embed="rId3">
+            <a:extLst>
+              <a:ext uri="{28A0092B-C50C-407E-A947-70E740481C1C}">
+                <a14:useLocalDpi xmlns:a14="http://schemas.microsoft.com/office/drawing/2010/main" val="0"/>
+              </a:ext>
+            </a:extLst>
+          </a:blip>
+          <a:srcRect/>
+          <a:stretch>
+            <a:fillRect/>
+          </a:stretch>
+        </p:blipFill>
+        <p:spPr bwMode="auto">
+          <a:xfrm>
+            <a:off x="6096000" y="3140074"/>
+            <a:ext cx="1524000" cy="1524001"/>
+          </a:xfrm>
+          <a:prstGeom prst="rect">
+            <a:avLst/>
+          </a:prstGeom>
+          <a:noFill/>
+          <a:extLst>
+            <a:ext uri="{909E8E84-426E-40DD-AFC4-6F175D3DCCD1}">
+              <a14:hiddenFill xmlns:a14="http://schemas.microsoft.com/office/drawing/2010/main">
+                <a:solidFill>
+                  <a:srgbClr val="FFFFFF"/>
+                </a:solidFill>
+              </a14:hiddenFill>
+            </a:ext>
+          </a:extLst>
+        </p:spPr>
+      </p:pic>
+      <p:sp>
+        <p:nvSpPr>
+          <p:cNvPr id="5" name="Espace réservé du contenu 4"/>
+          <p:cNvSpPr>
+            <a:spLocks noGrp="1"/>
+          </p:cNvSpPr>
+          <p:nvPr>
+            <p:ph idx="1"/>
+          </p:nvPr>
+        </p:nvSpPr>
+        <p:spPr/>
+        <p:txBody>
+          <a:bodyPr/>
+          <a:lstStyle/>
+          <a:p>
+            <a:endParaRPr lang="fr-FR" dirty="0"/>
+          </a:p>
+        </p:txBody>
+      </p:sp>
+      <p:pic>
+        <p:nvPicPr>
+          <p:cNvPr id="1028" name="Picture 4" descr="Résultat de recherche d'images pour &quot;cordova png&quot;"/>
+          <p:cNvPicPr>
+            <a:picLocks noChangeAspect="1" noChangeArrowheads="1"/>
+          </p:cNvPicPr>
+          <p:nvPr/>
+        </p:nvPicPr>
+        <p:blipFill>
+          <a:blip r:embed="rId4" cstate="print">
+            <a:extLst>
+              <a:ext uri="{28A0092B-C50C-407E-A947-70E740481C1C}">
+                <a14:useLocalDpi xmlns:a14="http://schemas.microsoft.com/office/drawing/2010/main" val="0"/>
+              </a:ext>
+            </a:extLst>
+          </a:blip>
+          <a:srcRect/>
+          <a:stretch>
+            <a:fillRect/>
+          </a:stretch>
+        </p:blipFill>
+        <p:spPr bwMode="auto">
+          <a:xfrm>
+            <a:off x="1619672" y="3302022"/>
+            <a:ext cx="2688233" cy="1200104"/>
+          </a:xfrm>
+          <a:prstGeom prst="rect">
+            <a:avLst/>
+          </a:prstGeom>
+          <a:noFill/>
+          <a:extLst>
+            <a:ext uri="{909E8E84-426E-40DD-AFC4-6F175D3DCCD1}">
+              <a14:hiddenFill xmlns:a14="http://schemas.microsoft.com/office/drawing/2010/main">
+                <a:solidFill>
+                  <a:srgbClr val="FFFFFF"/>
+                </a:solidFill>
+              </a14:hiddenFill>
+            </a:ext>
+          </a:extLst>
+        </p:spPr>
+      </p:pic>
     </p:spTree>
     <p:extLst>
       <p:ext uri="{BB962C8B-B14F-4D97-AF65-F5344CB8AC3E}">

</xml_diff>

<commit_message>
Ajout des commentaires correction
</commit_message>
<xml_diff>
--- a/presentation.pptx
+++ b/presentation.pptx
@@ -1111,7 +1111,7 @@
           <a:lstStyle/>
           <a:p>
             <a:r>
-              <a:rPr lang="fr-FR" sz="1200" b="1" i="0" kern="1200" dirty="0" err="1" smtClean="0">
+              <a:rPr lang="fr-FR" sz="1200" b="0" i="0" kern="1200" dirty="0" err="1" smtClean="0">
                 <a:solidFill>
                   <a:schemeClr val="tx1"/>
                 </a:solidFill>
@@ -1132,10 +1132,10 @@
                 <a:ea typeface="+mn-ea"/>
                 <a:cs typeface="+mn-cs"/>
               </a:rPr>
-              <a:t> est un </a:t>
-            </a:r>
-            <a:r>
-              <a:rPr lang="fr-FR" sz="1200" b="0" i="0" u="none" strike="noStrike" kern="1200" dirty="0" smtClean="0">
+              <a:t> est un </a:t>
+            </a:r>
+            <a:r>
+              <a:rPr lang="fr-FR" sz="1200" b="0" i="0" kern="1200" dirty="0" err="1" smtClean="0">
                 <a:solidFill>
                   <a:schemeClr val="tx1"/>
                 </a:solidFill>
@@ -1143,12 +1143,11 @@
                 <a:latin typeface="+mn-lt"/>
                 <a:ea typeface="+mn-ea"/>
                 <a:cs typeface="+mn-cs"/>
-                <a:hlinkClick r:id="rId3" tooltip="Framework"/>
               </a:rPr>
               <a:t>framework</a:t>
             </a:r>
             <a:r>
-              <a:rPr lang="fr-FR" sz="1200" b="0" i="0" u="none" strike="noStrike" kern="1200" baseline="30000" dirty="0" smtClean="0">
+              <a:rPr lang="fr-FR" sz="1200" b="0" i="0" kern="1200" dirty="0" smtClean="0">
                 <a:solidFill>
                   <a:schemeClr val="tx1"/>
                 </a:solidFill>
@@ -1156,12 +1155,11 @@
                 <a:latin typeface="+mn-lt"/>
                 <a:ea typeface="+mn-ea"/>
                 <a:cs typeface="+mn-cs"/>
-                <a:hlinkClick r:id="rId4"/>
-              </a:rPr>
-              <a:t>1</a:t>
-            </a:r>
-            <a:r>
-              <a:rPr lang="fr-FR" sz="1200" b="0" i="0" kern="1200" dirty="0" smtClean="0">
+              </a:rPr>
+              <a:t> </a:t>
+            </a:r>
+            <a:r>
+              <a:rPr lang="fr-FR" sz="1200" b="1" i="0" kern="1200" dirty="0" smtClean="0">
                 <a:solidFill>
                   <a:schemeClr val="tx1"/>
                 </a:solidFill>
@@ -1170,10 +1168,8 @@
                 <a:ea typeface="+mn-ea"/>
                 <a:cs typeface="+mn-cs"/>
               </a:rPr>
-              <a:t> open-source crée en 2013par DRIFTY . Deux versions distinctes sont disponibles, incompatibles entre elles : </a:t>
-            </a:r>
-          </a:p>
-          <a:p>
+              <a:t>complet</a:t>
+            </a:r>
             <a:r>
               <a:rPr lang="fr-FR" sz="1200" b="0" i="0" kern="1200" dirty="0" smtClean="0">
                 <a:solidFill>
@@ -1184,7 +1180,7 @@
                 <a:ea typeface="+mn-ea"/>
                 <a:cs typeface="+mn-cs"/>
               </a:rPr>
-              <a:t>la première version, 1.3.3 se base sur </a:t>
+              <a:t>, c’est-à-dire qu’il propose de vous aider dans le développement de votre interface graphique (</a:t>
             </a:r>
             <a:r>
               <a:rPr lang="fr-FR" sz="1200" b="0" i="0" kern="1200" dirty="0" err="1" smtClean="0">
@@ -1196,7 +1192,7 @@
                 <a:ea typeface="+mn-ea"/>
                 <a:cs typeface="+mn-cs"/>
               </a:rPr>
-              <a:t>AngularJS</a:t>
+              <a:t>frontend</a:t>
             </a:r>
             <a:r>
               <a:rPr lang="fr-FR" sz="1200" b="0" i="0" kern="1200" dirty="0" smtClean="0">
@@ -1208,12 +1204,10 @@
                 <a:ea typeface="+mn-ea"/>
                 <a:cs typeface="+mn-cs"/>
               </a:rPr>
-              <a:t> 1.5.3 </a:t>
-            </a:r>
-          </a:p>
-          <a:p>
-            <a:r>
-              <a:rPr lang="fr-FR" sz="1200" b="0" i="0" kern="1200" dirty="0" smtClean="0">
+              <a:t>), mais aussi dans le développement de toute la logique métier (</a:t>
+            </a:r>
+            <a:r>
+              <a:rPr lang="fr-FR" sz="1200" b="0" i="0" kern="1200" dirty="0" err="1" smtClean="0">
                 <a:solidFill>
                   <a:schemeClr val="tx1"/>
                 </a:solidFill>
@@ -1222,10 +1216,10 @@
                 <a:ea typeface="+mn-ea"/>
                 <a:cs typeface="+mn-cs"/>
               </a:rPr>
-              <a:t>tandis que la version 3.5.0 se base sur </a:t>
-            </a:r>
-            <a:r>
-              <a:rPr lang="fr-FR" sz="1200" b="0" i="0" kern="1200" dirty="0" err="1" smtClean="0">
+              <a:t>backend</a:t>
+            </a:r>
+            <a:r>
+              <a:rPr lang="fr-FR" sz="1200" b="0" i="0" kern="1200" dirty="0" smtClean="0">
                 <a:solidFill>
                   <a:schemeClr val="tx1"/>
                 </a:solidFill>
@@ -1234,8 +1228,10 @@
                 <a:ea typeface="+mn-ea"/>
                 <a:cs typeface="+mn-cs"/>
               </a:rPr>
-              <a:t>Angular</a:t>
-            </a:r>
+              <a:t>).</a:t>
+            </a:r>
+          </a:p>
+          <a:p>
             <a:r>
               <a:rPr lang="fr-FR" sz="1200" b="0" i="0" kern="1200" dirty="0" smtClean="0">
                 <a:solidFill>
@@ -1246,7 +1242,7 @@
                 <a:ea typeface="+mn-ea"/>
                 <a:cs typeface="+mn-cs"/>
               </a:rPr>
-              <a:t> 4.1.3 et </a:t>
+              <a:t>Interface graphique : Le </a:t>
             </a:r>
             <a:r>
               <a:rPr lang="fr-FR" sz="1200" b="0" i="0" kern="1200" dirty="0" err="1" smtClean="0">
@@ -1258,7 +1254,7 @@
                 <a:ea typeface="+mn-ea"/>
                 <a:cs typeface="+mn-cs"/>
               </a:rPr>
-              <a:t>TypeScript</a:t>
+              <a:t>framework</a:t>
             </a:r>
             <a:r>
               <a:rPr lang="fr-FR" sz="1200" b="0" i="0" kern="1200" dirty="0" smtClean="0">
@@ -1270,7 +1266,7 @@
                 <a:ea typeface="+mn-ea"/>
                 <a:cs typeface="+mn-cs"/>
               </a:rPr>
-              <a:t>.</a:t>
+              <a:t> possède son propre thème HTML/CSS afin de pouvoir disposer rapidement d’une application fonctionnelle</a:t>
             </a:r>
           </a:p>
           <a:p>
@@ -1284,7 +1280,7 @@
                 <a:ea typeface="+mn-ea"/>
                 <a:cs typeface="+mn-cs"/>
               </a:rPr>
-              <a:t>Il s’appuie sur </a:t>
+              <a:t>Logique </a:t>
             </a:r>
             <a:r>
               <a:rPr lang="fr-FR" sz="1200" b="0" i="0" kern="1200" dirty="0" err="1" smtClean="0">
@@ -1296,7 +1292,7 @@
                 <a:ea typeface="+mn-ea"/>
                 <a:cs typeface="+mn-cs"/>
               </a:rPr>
-              <a:t>Angular</a:t>
+              <a:t>metier</a:t>
             </a:r>
             <a:r>
               <a:rPr lang="fr-FR" sz="1200" b="0" i="0" kern="1200" dirty="0" smtClean="0">
@@ -1308,10 +1304,10 @@
                 <a:ea typeface="+mn-ea"/>
                 <a:cs typeface="+mn-cs"/>
               </a:rPr>
-              <a:t> pour la partie web et sur </a:t>
-            </a:r>
-            <a:r>
-              <a:rPr lang="fr-FR" sz="1200" b="0" i="0" u="none" strike="noStrike" kern="1200" dirty="0" err="1" smtClean="0">
+              <a:t> : Le </a:t>
+            </a:r>
+            <a:r>
+              <a:rPr lang="fr-FR" sz="1200" b="0" i="0" kern="1200" dirty="0" err="1" smtClean="0">
                 <a:solidFill>
                   <a:schemeClr val="tx1"/>
                 </a:solidFill>
@@ -1319,9 +1315,8 @@
                 <a:latin typeface="+mn-lt"/>
                 <a:ea typeface="+mn-ea"/>
                 <a:cs typeface="+mn-cs"/>
-                <a:hlinkClick r:id="rId5"/>
-              </a:rPr>
-              <a:t>Cordova</a:t>
+              </a:rPr>
+              <a:t>framework</a:t>
             </a:r>
             <a:r>
               <a:rPr lang="fr-FR" sz="1200" b="0" i="0" kern="1200" dirty="0" smtClean="0">
@@ -1333,10 +1328,8 @@
                 <a:ea typeface="+mn-ea"/>
                 <a:cs typeface="+mn-cs"/>
               </a:rPr>
-              <a:t> pour la partie native.</a:t>
-            </a:r>
-          </a:p>
-          <a:p>
+              <a:t> est basé sur </a:t>
+            </a:r>
             <a:r>
               <a:rPr lang="fr-FR" sz="1200" b="0" i="0" kern="1200" dirty="0" err="1" smtClean="0">
                 <a:solidFill>
@@ -1347,10 +1340,50 @@
                 <a:ea typeface="+mn-ea"/>
                 <a:cs typeface="+mn-cs"/>
               </a:rPr>
-              <a:t>Ionic</a:t>
-            </a:r>
-            <a:r>
-              <a:rPr lang="fr-FR" sz="1200" b="0" i="0" kern="1200" dirty="0" smtClean="0">
+              <a:t>AngularJS</a:t>
+            </a:r>
+            <a:endParaRPr lang="fr-FR" sz="1200" b="0" i="0" kern="1200" dirty="0" smtClean="0">
+              <a:solidFill>
+                <a:schemeClr val="tx1"/>
+              </a:solidFill>
+              <a:effectLst/>
+              <a:latin typeface="+mn-lt"/>
+              <a:ea typeface="+mn-ea"/>
+              <a:cs typeface="+mn-cs"/>
+            </a:endParaRPr>
+          </a:p>
+          <a:p>
+            <a:endParaRPr lang="fr-FR" dirty="0" smtClean="0"/>
+          </a:p>
+          <a:p>
+            <a:r>
+              <a:rPr lang="fr-FR" dirty="0" err="1" smtClean="0"/>
+              <a:t>Gulp</a:t>
+            </a:r>
+            <a:r>
+              <a:rPr lang="fr-FR" dirty="0" smtClean="0"/>
+              <a:t> :  </a:t>
+            </a:r>
+            <a:r>
+              <a:rPr lang="fr-FR" dirty="0" err="1" smtClean="0"/>
+              <a:t>toolkit</a:t>
+            </a:r>
+            <a:r>
+              <a:rPr lang="fr-FR" dirty="0" smtClean="0"/>
+              <a:t> JavaScript open-source , C'est un exécuteur de tâches construit sur Node.js et </a:t>
+            </a:r>
+            <a:r>
+              <a:rPr lang="fr-FR" dirty="0" err="1" smtClean="0"/>
+              <a:t>npm</a:t>
+            </a:r>
+            <a:r>
+              <a:rPr lang="fr-FR" dirty="0" smtClean="0"/>
+              <a:t>, utilisé pour l'automatisation des tâches répétitives dans le développement web</a:t>
+            </a:r>
+          </a:p>
+          <a:p>
+            <a:r>
+              <a:rPr lang="fr-FR" sz="1200" b="0" i="0" kern="1200" dirty="0" err="1" smtClean="0">
                 <a:solidFill>
                   <a:schemeClr val="tx1"/>
                 </a:solidFill>
@@ -1359,10 +1392,10 @@
                 <a:ea typeface="+mn-ea"/>
                 <a:cs typeface="+mn-cs"/>
               </a:rPr>
-              <a:t> permet de créer un code </a:t>
-            </a:r>
-            <a:r>
-              <a:rPr lang="fr-FR" sz="1200" b="0" i="0" kern="1200" dirty="0" err="1" smtClean="0">
+              <a:t>Angularjs</a:t>
+            </a:r>
+            <a:r>
+              <a:rPr lang="fr-FR" sz="1200" b="0" i="0" kern="1200" dirty="0" smtClean="0">
                 <a:solidFill>
                   <a:schemeClr val="tx1"/>
                 </a:solidFill>
@@ -1371,10 +1404,12 @@
                 <a:ea typeface="+mn-ea"/>
                 <a:cs typeface="+mn-cs"/>
               </a:rPr>
-              <a:t>multisupport</a:t>
-            </a:r>
-            <a:r>
-              <a:rPr lang="fr-FR" sz="1200" b="0" i="0" kern="1200" dirty="0" smtClean="0">
+              <a:t> : pour suivre la structure model , vue contrôleur </a:t>
+            </a:r>
+          </a:p>
+          <a:p>
+            <a:r>
+              <a:rPr lang="fr-FR" sz="1200" b="0" i="0" kern="1200" dirty="0" err="1" smtClean="0">
                 <a:solidFill>
                   <a:schemeClr val="tx1"/>
                 </a:solidFill>
@@ -1383,10 +1418,10 @@
                 <a:ea typeface="+mn-ea"/>
                 <a:cs typeface="+mn-cs"/>
               </a:rPr>
-              <a:t> en utilisant des outils </a:t>
-            </a:r>
-            <a:r>
-              <a:rPr lang="fr-FR" sz="1200" b="0" i="0" u="none" strike="noStrike" kern="1200" dirty="0" smtClean="0">
+              <a:t>Sass</a:t>
+            </a:r>
+            <a:r>
+              <a:rPr lang="fr-FR" sz="1200" b="0" i="0" kern="1200" dirty="0" smtClean="0">
                 <a:solidFill>
                   <a:schemeClr val="tx1"/>
                 </a:solidFill>
@@ -1394,9 +1429,19 @@
                 <a:latin typeface="+mn-lt"/>
                 <a:ea typeface="+mn-ea"/>
                 <a:cs typeface="+mn-cs"/>
-                <a:hlinkClick r:id="rId6" tooltip="Web"/>
-              </a:rPr>
-              <a:t>Web</a:t>
+              </a:rPr>
+              <a:t> : permet notamment de modifier les variables du thème afin de changer les couleurs, les polices et tout autre paramètre disponible.</a:t>
+            </a:r>
+            <a:endParaRPr lang="fr-FR" dirty="0" smtClean="0"/>
+          </a:p>
+          <a:p>
+            <a:r>
+              <a:rPr lang="fr-FR" dirty="0" err="1" smtClean="0"/>
+              <a:t>Cordova</a:t>
+            </a:r>
+            <a:r>
+              <a:rPr lang="fr-FR" dirty="0" smtClean="0"/>
+              <a:t> : </a:t>
             </a:r>
             <a:r>
               <a:rPr lang="fr-FR" sz="1200" b="0" i="0" kern="1200" dirty="0" smtClean="0">
@@ -1408,10 +1453,10 @@
                 <a:ea typeface="+mn-ea"/>
                 <a:cs typeface="+mn-cs"/>
               </a:rPr>
-              <a:t> comme </a:t>
-            </a:r>
-            <a:r>
-              <a:rPr lang="fr-FR" sz="1200" b="0" i="0" u="none" strike="noStrike" kern="1200" dirty="0" smtClean="0">
+              <a:t> Il permet d'exploiter les technologies Web courantes telles que HTML5, CSS3 et JavaScript pour développer des applications </a:t>
+            </a:r>
+            <a:r>
+              <a:rPr lang="fr-FR" sz="1200" b="0" i="0" kern="1200" dirty="0" err="1" smtClean="0">
                 <a:solidFill>
                   <a:schemeClr val="tx1"/>
                 </a:solidFill>
@@ -1419,9 +1464,8 @@
                 <a:latin typeface="+mn-lt"/>
                 <a:ea typeface="+mn-ea"/>
                 <a:cs typeface="+mn-cs"/>
-                <a:hlinkClick r:id="rId7" tooltip="HTML"/>
-              </a:rPr>
-              <a:t>HTML</a:t>
+              </a:rPr>
+              <a:t>multi-plateformes</a:t>
             </a:r>
             <a:r>
               <a:rPr lang="fr-FR" sz="1200" b="0" i="0" kern="1200" dirty="0" smtClean="0">
@@ -1433,173 +1477,8 @@
                 <a:ea typeface="+mn-ea"/>
                 <a:cs typeface="+mn-cs"/>
               </a:rPr>
-              <a:t>, </a:t>
-            </a:r>
-            <a:r>
-              <a:rPr lang="fr-FR" sz="1200" b="0" i="0" u="none" strike="noStrike" kern="1200" dirty="0" smtClean="0">
-                <a:solidFill>
-                  <a:schemeClr val="tx1"/>
-                </a:solidFill>
-                <a:effectLst/>
-                <a:latin typeface="+mn-lt"/>
-                <a:ea typeface="+mn-ea"/>
-                <a:cs typeface="+mn-cs"/>
-                <a:hlinkClick r:id="rId8" tooltip="Feuilles de style en cascade"/>
-              </a:rPr>
-              <a:t>CSS</a:t>
-            </a:r>
-            <a:r>
-              <a:rPr lang="fr-FR" sz="1200" b="0" i="0" kern="1200" dirty="0" smtClean="0">
-                <a:solidFill>
-                  <a:schemeClr val="tx1"/>
-                </a:solidFill>
-                <a:effectLst/>
-                <a:latin typeface="+mn-lt"/>
-                <a:ea typeface="+mn-ea"/>
-                <a:cs typeface="+mn-cs"/>
-              </a:rPr>
-              <a:t>, </a:t>
-            </a:r>
-            <a:r>
-              <a:rPr lang="fr-FR" sz="1200" b="0" i="0" u="none" strike="noStrike" kern="1200" dirty="0" smtClean="0">
-                <a:solidFill>
-                  <a:schemeClr val="tx1"/>
-                </a:solidFill>
-                <a:effectLst/>
-                <a:latin typeface="+mn-lt"/>
-                <a:ea typeface="+mn-ea"/>
-                <a:cs typeface="+mn-cs"/>
-                <a:hlinkClick r:id="rId9" tooltip="JavaScript"/>
-              </a:rPr>
-              <a:t>JavaScript</a:t>
-            </a:r>
-            <a:r>
-              <a:rPr lang="fr-FR" sz="1200" b="0" i="0" kern="1200" dirty="0" smtClean="0">
-                <a:solidFill>
-                  <a:schemeClr val="tx1"/>
-                </a:solidFill>
-                <a:effectLst/>
-                <a:latin typeface="+mn-lt"/>
-                <a:ea typeface="+mn-ea"/>
-                <a:cs typeface="+mn-cs"/>
-              </a:rPr>
-              <a:t>, </a:t>
-            </a:r>
-          </a:p>
-          <a:p>
-            <a:r>
-              <a:rPr lang="fr-FR" sz="1200" b="0" i="0" kern="1200" dirty="0" smtClean="0">
-                <a:solidFill>
-                  <a:schemeClr val="tx1"/>
-                </a:solidFill>
-                <a:effectLst/>
-                <a:latin typeface="+mn-lt"/>
-                <a:ea typeface="+mn-ea"/>
-                <a:cs typeface="+mn-cs"/>
-              </a:rPr>
-              <a:t>afin de générer des applications </a:t>
-            </a:r>
-            <a:r>
-              <a:rPr lang="fr-FR" sz="1200" b="0" i="0" u="none" strike="noStrike" kern="1200" dirty="0" smtClean="0">
-                <a:solidFill>
-                  <a:schemeClr val="tx1"/>
-                </a:solidFill>
-                <a:effectLst/>
-                <a:latin typeface="+mn-lt"/>
-                <a:ea typeface="+mn-ea"/>
-                <a:cs typeface="+mn-cs"/>
-                <a:hlinkClick r:id="rId10" tooltip="Apple iOS"/>
-              </a:rPr>
-              <a:t>iOS</a:t>
-            </a:r>
-            <a:r>
-              <a:rPr lang="fr-FR" sz="1200" b="0" i="0" kern="1200" dirty="0" smtClean="0">
-                <a:solidFill>
-                  <a:schemeClr val="tx1"/>
-                </a:solidFill>
-                <a:effectLst/>
-                <a:latin typeface="+mn-lt"/>
-                <a:ea typeface="+mn-ea"/>
-                <a:cs typeface="+mn-cs"/>
-              </a:rPr>
-              <a:t>, </a:t>
-            </a:r>
-            <a:r>
-              <a:rPr lang="fr-FR" sz="1200" b="0" i="0" u="none" strike="noStrike" kern="1200" dirty="0" smtClean="0">
-                <a:solidFill>
-                  <a:schemeClr val="tx1"/>
-                </a:solidFill>
-                <a:effectLst/>
-                <a:latin typeface="+mn-lt"/>
-                <a:ea typeface="+mn-ea"/>
-                <a:cs typeface="+mn-cs"/>
-                <a:hlinkClick r:id="rId11" tooltip="Android"/>
-              </a:rPr>
-              <a:t>Android</a:t>
-            </a:r>
-            <a:r>
-              <a:rPr lang="fr-FR" sz="1200" b="0" i="0" kern="1200" dirty="0" smtClean="0">
-                <a:solidFill>
-                  <a:schemeClr val="tx1"/>
-                </a:solidFill>
-                <a:effectLst/>
-                <a:latin typeface="+mn-lt"/>
-                <a:ea typeface="+mn-ea"/>
-                <a:cs typeface="+mn-cs"/>
-              </a:rPr>
-              <a:t>, </a:t>
-            </a:r>
-            <a:r>
-              <a:rPr lang="fr-FR" sz="1200" b="0" i="0" u="none" strike="noStrike" kern="1200" dirty="0" smtClean="0">
-                <a:solidFill>
-                  <a:schemeClr val="tx1"/>
-                </a:solidFill>
-                <a:effectLst/>
-                <a:latin typeface="+mn-lt"/>
-                <a:ea typeface="+mn-ea"/>
-                <a:cs typeface="+mn-cs"/>
-                <a:hlinkClick r:id="rId12" tooltip="Chrome OS"/>
-              </a:rPr>
-              <a:t>Chrome</a:t>
-            </a:r>
-            <a:r>
-              <a:rPr lang="fr-FR" sz="1200" b="0" i="0" kern="1200" dirty="0" smtClean="0">
-                <a:solidFill>
-                  <a:schemeClr val="tx1"/>
-                </a:solidFill>
-                <a:effectLst/>
-                <a:latin typeface="+mn-lt"/>
-                <a:ea typeface="+mn-ea"/>
-                <a:cs typeface="+mn-cs"/>
-              </a:rPr>
-              <a:t>, </a:t>
-            </a:r>
-            <a:r>
-              <a:rPr lang="fr-FR" sz="1200" b="0" i="0" u="none" strike="noStrike" kern="1200" dirty="0" smtClean="0">
-                <a:solidFill>
-                  <a:schemeClr val="tx1"/>
-                </a:solidFill>
-                <a:effectLst/>
-                <a:latin typeface="+mn-lt"/>
-                <a:ea typeface="+mn-ea"/>
-                <a:cs typeface="+mn-cs"/>
-                <a:hlinkClick r:id="rId13" tooltip="Windows Phone"/>
-              </a:rPr>
-              <a:t>Windows Phone</a:t>
-            </a:r>
-            <a:r>
-              <a:rPr lang="fr-FR" sz="1200" b="0" i="0" kern="1200" dirty="0" smtClean="0">
-                <a:solidFill>
-                  <a:schemeClr val="tx1"/>
-                </a:solidFill>
-                <a:effectLst/>
-                <a:latin typeface="+mn-lt"/>
-                <a:ea typeface="+mn-ea"/>
-                <a:cs typeface="+mn-cs"/>
-              </a:rPr>
-              <a:t> et bien d'autres.</a:t>
-            </a:r>
-            <a:endParaRPr lang="fr-FR" dirty="0" smtClean="0"/>
+              <a:t>, s'appuient sur des API conformes aux standards permettant l'accès aux capteurs de chaque appareil, aux données ainsi qu'à l'état du réseau.</a:t>
+            </a:r>
           </a:p>
           <a:p>
             <a:endParaRPr lang="fr-FR" dirty="0"/>
@@ -7632,10 +7511,6 @@
               </a:rPr>
               <a:t>GENERALITE</a:t>
             </a:r>
-            <a:endParaRPr lang="fr-FR" dirty="0" smtClean="0">
-              <a:latin typeface="Calibri Light" panose="020F0302020204030204" pitchFamily="34" charset="0"/>
-              <a:cs typeface="Calibri Light" panose="020F0302020204030204" pitchFamily="34" charset="0"/>
-            </a:endParaRPr>
           </a:p>
           <a:p>
             <a:pPr marL="114300" indent="0" algn="just">
@@ -7655,10 +7530,6 @@
               </a:rPr>
               <a:t>FONCTIONNEMENT</a:t>
             </a:r>
-            <a:endParaRPr lang="fr-FR" dirty="0" smtClean="0">
-              <a:latin typeface="Calibri Light" panose="020F0302020204030204" pitchFamily="34" charset="0"/>
-              <a:cs typeface="Calibri Light" panose="020F0302020204030204" pitchFamily="34" charset="0"/>
-            </a:endParaRPr>
           </a:p>
           <a:p>
             <a:pPr algn="just"/>
@@ -7676,10 +7547,6 @@
               </a:rPr>
               <a:t>FRONT-END / BACK-END</a:t>
             </a:r>
-            <a:endParaRPr lang="fr-FR" dirty="0" smtClean="0">
-              <a:latin typeface="Calibri Light" panose="020F0302020204030204" pitchFamily="34" charset="0"/>
-              <a:cs typeface="Calibri Light" panose="020F0302020204030204" pitchFamily="34" charset="0"/>
-            </a:endParaRPr>
           </a:p>
           <a:p>
             <a:pPr algn="just"/>

</xml_diff>